<commit_message>
Fixed figures from Section 10
</commit_message>
<xml_diff>
--- a/ITI/TF/Volume1/media/Figure_10.3-2.pptx
+++ b/ITI/TF/Volume1/media/Figure_10.3-2.pptx
@@ -104,6 +104,11 @@
       </a:defRPr>
     </a:lvl9pPr>
   </p:defaultTextStyle>
+  <p:extLst>
+    <p:ext uri="{EFAFB233-063F-42B5-8137-9DF3F51BA10A}">
+      <p15:sldGuideLst xmlns:p15="http://schemas.microsoft.com/office/powerpoint/2012/main"/>
+    </p:ext>
+  </p:extLst>
 </p:presentation>
 </file>
 
@@ -254,7 +259,7 @@
           <a:p>
             <a:fld id="{DA2743A0-7BBA-6440-8FCE-C884DCC1C920}" type="datetimeFigureOut">
               <a:rPr lang="en-US" smtClean="0"/>
-              <a:t>8/10/20</a:t>
+              <a:t>8/25/20</a:t>
             </a:fld>
             <a:endParaRPr lang="en-US"/>
           </a:p>
@@ -452,7 +457,7 @@
           <a:p>
             <a:fld id="{DA2743A0-7BBA-6440-8FCE-C884DCC1C920}" type="datetimeFigureOut">
               <a:rPr lang="en-US" smtClean="0"/>
-              <a:t>8/10/20</a:t>
+              <a:t>8/25/20</a:t>
             </a:fld>
             <a:endParaRPr lang="en-US"/>
           </a:p>
@@ -660,7 +665,7 @@
           <a:p>
             <a:fld id="{DA2743A0-7BBA-6440-8FCE-C884DCC1C920}" type="datetimeFigureOut">
               <a:rPr lang="en-US" smtClean="0"/>
-              <a:t>8/10/20</a:t>
+              <a:t>8/25/20</a:t>
             </a:fld>
             <a:endParaRPr lang="en-US"/>
           </a:p>
@@ -858,7 +863,7 @@
           <a:p>
             <a:fld id="{DA2743A0-7BBA-6440-8FCE-C884DCC1C920}" type="datetimeFigureOut">
               <a:rPr lang="en-US" smtClean="0"/>
-              <a:t>8/10/20</a:t>
+              <a:t>8/25/20</a:t>
             </a:fld>
             <a:endParaRPr lang="en-US"/>
           </a:p>
@@ -1133,7 +1138,7 @@
           <a:p>
             <a:fld id="{DA2743A0-7BBA-6440-8FCE-C884DCC1C920}" type="datetimeFigureOut">
               <a:rPr lang="en-US" smtClean="0"/>
-              <a:t>8/10/20</a:t>
+              <a:t>8/25/20</a:t>
             </a:fld>
             <a:endParaRPr lang="en-US"/>
           </a:p>
@@ -1398,7 +1403,7 @@
           <a:p>
             <a:fld id="{DA2743A0-7BBA-6440-8FCE-C884DCC1C920}" type="datetimeFigureOut">
               <a:rPr lang="en-US" smtClean="0"/>
-              <a:t>8/10/20</a:t>
+              <a:t>8/25/20</a:t>
             </a:fld>
             <a:endParaRPr lang="en-US"/>
           </a:p>
@@ -1810,7 +1815,7 @@
           <a:p>
             <a:fld id="{DA2743A0-7BBA-6440-8FCE-C884DCC1C920}" type="datetimeFigureOut">
               <a:rPr lang="en-US" smtClean="0"/>
-              <a:t>8/10/20</a:t>
+              <a:t>8/25/20</a:t>
             </a:fld>
             <a:endParaRPr lang="en-US"/>
           </a:p>
@@ -1951,7 +1956,7 @@
           <a:p>
             <a:fld id="{DA2743A0-7BBA-6440-8FCE-C884DCC1C920}" type="datetimeFigureOut">
               <a:rPr lang="en-US" smtClean="0"/>
-              <a:t>8/10/20</a:t>
+              <a:t>8/25/20</a:t>
             </a:fld>
             <a:endParaRPr lang="en-US"/>
           </a:p>
@@ -2064,7 +2069,7 @@
           <a:p>
             <a:fld id="{DA2743A0-7BBA-6440-8FCE-C884DCC1C920}" type="datetimeFigureOut">
               <a:rPr lang="en-US" smtClean="0"/>
-              <a:t>8/10/20</a:t>
+              <a:t>8/25/20</a:t>
             </a:fld>
             <a:endParaRPr lang="en-US"/>
           </a:p>
@@ -2375,7 +2380,7 @@
           <a:p>
             <a:fld id="{DA2743A0-7BBA-6440-8FCE-C884DCC1C920}" type="datetimeFigureOut">
               <a:rPr lang="en-US" smtClean="0"/>
-              <a:t>8/10/20</a:t>
+              <a:t>8/25/20</a:t>
             </a:fld>
             <a:endParaRPr lang="en-US"/>
           </a:p>
@@ -2663,7 +2668,7 @@
           <a:p>
             <a:fld id="{DA2743A0-7BBA-6440-8FCE-C884DCC1C920}" type="datetimeFigureOut">
               <a:rPr lang="en-US" smtClean="0"/>
-              <a:t>8/10/20</a:t>
+              <a:t>8/25/20</a:t>
             </a:fld>
             <a:endParaRPr lang="en-US"/>
           </a:p>
@@ -2904,7 +2909,7 @@
           <a:p>
             <a:fld id="{DA2743A0-7BBA-6440-8FCE-C884DCC1C920}" type="datetimeFigureOut">
               <a:rPr lang="en-US" smtClean="0"/>
-              <a:t>8/10/20</a:t>
+              <a:t>8/25/20</a:t>
             </a:fld>
             <a:endParaRPr lang="en-US"/>
           </a:p>
@@ -3337,8 +3342,8 @@
         </p:nvSpPr>
         <p:spPr bwMode="auto">
           <a:xfrm flipH="1">
-            <a:off x="5019675" y="457200"/>
-            <a:ext cx="0" cy="1649413"/>
+            <a:off x="4995861" y="278783"/>
+            <a:ext cx="31287" cy="2642813"/>
           </a:xfrm>
           <a:prstGeom prst="line">
             <a:avLst/>
@@ -3389,8 +3394,8 @@
         </p:nvSpPr>
         <p:spPr bwMode="auto">
           <a:xfrm>
-            <a:off x="0" y="457200"/>
-            <a:ext cx="5830888" cy="2746375"/>
+            <a:off x="0" y="78062"/>
+            <a:ext cx="5898995" cy="3421642"/>
           </a:xfrm>
           <a:prstGeom prst="rect">
             <a:avLst/>
@@ -3442,8 +3447,8 @@
         </p:nvSpPr>
         <p:spPr bwMode="auto">
           <a:xfrm>
-            <a:off x="2914650" y="457200"/>
-            <a:ext cx="1284288" cy="549275"/>
+            <a:off x="2775260" y="100363"/>
+            <a:ext cx="1512886" cy="549275"/>
           </a:xfrm>
           <a:prstGeom prst="rect">
             <a:avLst/>
@@ -3561,8 +3566,8 @@
         </p:nvSpPr>
         <p:spPr bwMode="auto">
           <a:xfrm>
-            <a:off x="1477963" y="457200"/>
-            <a:ext cx="1084262" cy="338138"/>
+            <a:off x="1332998" y="111513"/>
+            <a:ext cx="1333497" cy="356833"/>
           </a:xfrm>
           <a:prstGeom prst="rect">
             <a:avLst/>
@@ -3611,7 +3616,7 @@
               <a:tabLst/>
             </a:pPr>
             <a:r>
-              <a:rPr kumimoji="0" lang="fr-FR" altLang="en-US" sz="900" b="0" i="0" u="none" strike="noStrike" cap="none" normalizeH="0" baseline="0">
+              <a:rPr kumimoji="0" lang="fr-FR" altLang="en-US" sz="900" b="0" i="0" u="none" strike="noStrike" cap="none" normalizeH="0" baseline="0" dirty="0">
                 <a:ln>
                   <a:noFill/>
                 </a:ln>
@@ -3625,7 +3630,7 @@
               <a:t>Document Source: </a:t>
             </a:r>
             <a:br>
-              <a:rPr kumimoji="0" lang="fr-FR" altLang="en-US" sz="900" b="0" i="0" u="none" strike="noStrike" cap="none" normalizeH="0" baseline="0">
+              <a:rPr kumimoji="0" lang="fr-FR" altLang="en-US" sz="900" b="0" i="0" u="none" strike="noStrike" cap="none" normalizeH="0" baseline="0" dirty="0">
                 <a:ln>
                   <a:noFill/>
                 </a:ln>
@@ -3638,7 +3643,7 @@
               </a:rPr>
             </a:br>
             <a:r>
-              <a:rPr kumimoji="0" lang="fr-FR" altLang="en-US" sz="900" b="0" i="1" u="none" strike="noStrike" cap="none" normalizeH="0" baseline="0">
+              <a:rPr kumimoji="0" lang="fr-FR" altLang="en-US" sz="900" b="0" i="1" u="none" strike="noStrike" cap="none" normalizeH="0" baseline="0" dirty="0">
                 <a:ln>
                   <a:noFill/>
                 </a:ln>
@@ -3651,7 +3656,7 @@
               </a:rPr>
               <a:t>(PCP EHR-CR)</a:t>
             </a:r>
-            <a:endParaRPr kumimoji="0" lang="fr-FR" altLang="en-US" sz="1800" b="0" i="0" u="none" strike="noStrike" cap="none" normalizeH="0" baseline="0">
+            <a:endParaRPr kumimoji="0" lang="fr-FR" altLang="en-US" sz="1800" b="0" i="0" u="none" strike="noStrike" cap="none" normalizeH="0" baseline="0" dirty="0">
               <a:ln>
                 <a:noFill/>
               </a:ln>
@@ -3680,8 +3685,8 @@
         </p:nvSpPr>
         <p:spPr bwMode="auto">
           <a:xfrm>
-            <a:off x="4416425" y="457200"/>
-            <a:ext cx="1231900" cy="549275"/>
+            <a:off x="4257346" y="89213"/>
+            <a:ext cx="1333497" cy="379138"/>
           </a:xfrm>
           <a:prstGeom prst="rect">
             <a:avLst/>
@@ -3730,7 +3735,7 @@
               <a:tabLst/>
             </a:pPr>
             <a:r>
-              <a:rPr kumimoji="0" lang="en-US" altLang="en-US" sz="900" b="0" i="0" u="none" strike="noStrike" cap="none" normalizeH="0" baseline="0">
+              <a:rPr kumimoji="0" lang="en-US" altLang="en-US" sz="900" b="0" i="0" u="none" strike="noStrike" cap="none" normalizeH="0" baseline="0" dirty="0">
                 <a:ln>
                   <a:noFill/>
                 </a:ln>
@@ -3744,7 +3749,7 @@
               <a:t>Document Registry: </a:t>
             </a:r>
             <a:r>
-              <a:rPr kumimoji="0" lang="en-US" altLang="en-US" sz="900" b="0" i="1" u="none" strike="noStrike" cap="none" normalizeH="0" baseline="0">
+              <a:rPr kumimoji="0" lang="en-US" altLang="en-US" sz="900" b="0" i="1" u="none" strike="noStrike" cap="none" normalizeH="0" baseline="0" dirty="0">
                 <a:ln>
                   <a:noFill/>
                 </a:ln>
@@ -3757,7 +3762,7 @@
               </a:rPr>
               <a:t>(Cardiology Network)</a:t>
             </a:r>
-            <a:endParaRPr kumimoji="0" lang="en-US" altLang="en-US" sz="1800" b="0" i="0" u="none" strike="noStrike" cap="none" normalizeH="0" baseline="0">
+            <a:endParaRPr kumimoji="0" lang="en-US" altLang="en-US" sz="1800" b="0" i="0" u="none" strike="noStrike" cap="none" normalizeH="0" baseline="0" dirty="0">
               <a:ln>
                 <a:noFill/>
               </a:ln>
@@ -3786,8 +3791,8 @@
         </p:nvSpPr>
         <p:spPr bwMode="auto">
           <a:xfrm flipH="1">
-            <a:off x="2014538" y="457200"/>
-            <a:ext cx="0" cy="1649413"/>
+            <a:off x="1995489" y="457200"/>
+            <a:ext cx="19049" cy="2464403"/>
           </a:xfrm>
           <a:prstGeom prst="line">
             <a:avLst/>
@@ -3837,9 +3842,9 @@
           <p:nvPr/>
         </p:nvSpPr>
         <p:spPr bwMode="auto">
-          <a:xfrm>
-            <a:off x="3562350" y="457200"/>
-            <a:ext cx="0" cy="1649413"/>
+          <a:xfrm flipH="1">
+            <a:off x="3532187" y="457200"/>
+            <a:ext cx="30163" cy="2464401"/>
           </a:xfrm>
           <a:prstGeom prst="line">
             <a:avLst/>
@@ -3890,7 +3895,7 @@
         </p:nvSpPr>
         <p:spPr bwMode="auto">
           <a:xfrm>
-            <a:off x="1955800" y="457200"/>
+            <a:off x="1955800" y="2007219"/>
             <a:ext cx="114300" cy="685800"/>
           </a:xfrm>
           <a:prstGeom prst="rect">
@@ -3936,7 +3941,7 @@
         </p:nvSpPr>
         <p:spPr bwMode="auto">
           <a:xfrm>
-            <a:off x="3502025" y="457200"/>
+            <a:off x="3502025" y="2196784"/>
             <a:ext cx="114300" cy="546100"/>
           </a:xfrm>
           <a:prstGeom prst="rect">
@@ -3982,7 +3987,7 @@
         </p:nvSpPr>
         <p:spPr bwMode="auto">
           <a:xfrm>
-            <a:off x="4954588" y="457200"/>
+            <a:off x="4954588" y="1170876"/>
             <a:ext cx="114300" cy="280988"/>
           </a:xfrm>
           <a:prstGeom prst="rect">
@@ -4028,7 +4033,7 @@
         </p:nvSpPr>
         <p:spPr bwMode="auto">
           <a:xfrm>
-            <a:off x="2070100" y="457200"/>
+            <a:off x="2070100" y="2453267"/>
             <a:ext cx="1409700" cy="1588"/>
           </a:xfrm>
           <a:prstGeom prst="line">
@@ -4079,8 +4084,8 @@
         </p:nvSpPr>
         <p:spPr bwMode="auto">
           <a:xfrm>
-            <a:off x="2255838" y="457200"/>
-            <a:ext cx="1050925" cy="342900"/>
+            <a:off x="2166630" y="2074121"/>
+            <a:ext cx="1309688" cy="342900"/>
           </a:xfrm>
           <a:prstGeom prst="rect">
             <a:avLst/>
@@ -4134,7 +4139,7 @@
               <a:tabLst/>
             </a:pPr>
             <a:r>
-              <a:rPr kumimoji="0" lang="en-US" altLang="en-US" sz="800" b="0" i="0" u="none" strike="noStrike" cap="none" normalizeH="0" baseline="0">
+              <a:rPr kumimoji="0" lang="en-US" altLang="en-US" sz="800" b="0" i="0" u="none" strike="noStrike" cap="none" normalizeH="0" baseline="0" dirty="0">
                 <a:ln>
                   <a:noFill/>
                 </a:ln>
@@ -4147,7 +4152,7 @@
               </a:rPr>
               <a:t>4. Provide and Register Document Set</a:t>
             </a:r>
-            <a:endParaRPr kumimoji="0" lang="en-US" altLang="en-US" sz="1800" b="0" i="0" u="none" strike="noStrike" cap="none" normalizeH="0" baseline="0">
+            <a:endParaRPr kumimoji="0" lang="en-US" altLang="en-US" sz="1800" b="0" i="0" u="none" strike="noStrike" cap="none" normalizeH="0" baseline="0" dirty="0">
               <a:ln>
                 <a:noFill/>
               </a:ln>
@@ -4176,7 +4181,7 @@
         </p:nvSpPr>
         <p:spPr bwMode="auto">
           <a:xfrm>
-            <a:off x="3609975" y="457200"/>
+            <a:off x="3609975" y="2620536"/>
             <a:ext cx="1344613" cy="0"/>
           </a:xfrm>
           <a:prstGeom prst="line">
@@ -4227,7 +4232,7 @@
         </p:nvSpPr>
         <p:spPr bwMode="auto">
           <a:xfrm>
-            <a:off x="3729038" y="457200"/>
+            <a:off x="3706484" y="2285992"/>
             <a:ext cx="1177925" cy="247650"/>
           </a:xfrm>
           <a:prstGeom prst="rect">
@@ -4282,7 +4287,7 @@
               <a:tabLst/>
             </a:pPr>
             <a:r>
-              <a:rPr kumimoji="0" lang="en-US" altLang="en-US" sz="800" b="0" i="0" u="none" strike="noStrike" cap="none" normalizeH="0" baseline="0">
+              <a:rPr kumimoji="0" lang="en-US" altLang="en-US" sz="800" b="0" i="0" u="none" strike="noStrike" cap="none" normalizeH="0" baseline="0" dirty="0">
                 <a:ln>
                   <a:noFill/>
                 </a:ln>
@@ -4290,13 +4295,13 @@
                   <a:schemeClr val="tx1"/>
                 </a:solidFill>
                 <a:effectLst/>
-                <a:latin typeface="Times New Roman" panose="02020603050405020304" pitchFamily="18" charset="0"/>
+                <a:latin typeface="Arial" panose="020B0604020202020204" pitchFamily="34" charset="0"/>
                 <a:ea typeface="Times New Roman" panose="02020603050405020304" pitchFamily="18" charset="0"/>
                 <a:cs typeface="Arial" panose="020B0604020202020204" pitchFamily="34" charset="0"/>
               </a:rPr>
               <a:t>5. Register Document Set</a:t>
             </a:r>
-            <a:endParaRPr kumimoji="0" lang="en-US" altLang="en-US" sz="1800" b="0" i="0" u="none" strike="noStrike" cap="none" normalizeH="0" baseline="0">
+            <a:endParaRPr kumimoji="0" lang="en-US" altLang="en-US" sz="1800" b="0" i="0" u="none" strike="noStrike" cap="none" normalizeH="0" baseline="0" dirty="0">
               <a:ln>
                 <a:noFill/>
               </a:ln>
@@ -4305,6 +4310,7 @@
               </a:solidFill>
               <a:effectLst/>
               <a:latin typeface="Arial" panose="020B0604020202020204" pitchFamily="34" charset="0"/>
+              <a:cs typeface="Arial" panose="020B0604020202020204" pitchFamily="34" charset="0"/>
             </a:endParaRPr>
           </a:p>
         </p:txBody>
@@ -4325,8 +4331,8 @@
         </p:nvSpPr>
         <p:spPr bwMode="auto">
           <a:xfrm>
-            <a:off x="66675" y="457200"/>
-            <a:ext cx="1257300" cy="452438"/>
+            <a:off x="66674" y="111512"/>
+            <a:ext cx="1365119" cy="452438"/>
           </a:xfrm>
           <a:prstGeom prst="rect">
             <a:avLst/>
@@ -4375,20 +4381,7 @@
               <a:tabLst/>
             </a:pPr>
             <a:r>
-              <a:rPr kumimoji="0" lang="en-US" altLang="en-US" sz="900" b="0" i="0" u="none" strike="noStrike" cap="none" normalizeH="0" baseline="0">
-                <a:ln>
-                  <a:noFill/>
-                </a:ln>
-                <a:solidFill>
-                  <a:schemeClr val="tx1"/>
-                </a:solidFill>
-                <a:effectLst/>
-                <a:ea typeface="Times New Roman" panose="02020603050405020304" pitchFamily="18" charset="0"/>
-              </a:rPr>
-              <a:t>Document Consumer:</a:t>
-            </a:r>
-            <a:br>
-              <a:rPr kumimoji="0" lang="en-US" altLang="en-US" sz="900" b="0" i="1" u="none" strike="noStrike" cap="none" normalizeH="0" baseline="0">
+              <a:rPr kumimoji="0" lang="en-US" altLang="en-US" sz="900" b="0" i="0" u="none" strike="noStrike" cap="none" normalizeH="0" baseline="0" dirty="0">
                 <a:ln>
                   <a:noFill/>
                 </a:ln>
@@ -4398,10 +4391,12 @@
                 <a:effectLst/>
                 <a:latin typeface="Arial" panose="020B0604020202020204" pitchFamily="34" charset="0"/>
                 <a:ea typeface="Times New Roman" panose="02020603050405020304" pitchFamily="18" charset="0"/>
+                <a:cs typeface="Arial" panose="020B0604020202020204" pitchFamily="34" charset="0"/>
               </a:rPr>
-            </a:br>
-            <a:r>
-              <a:rPr kumimoji="0" lang="en-US" altLang="en-US" sz="900" b="0" i="1" u="none" strike="noStrike" cap="none" normalizeH="0" baseline="0">
+              <a:t>Document Consumer:</a:t>
+            </a:r>
+            <a:br>
+              <a:rPr kumimoji="0" lang="en-US" altLang="en-US" sz="900" b="0" i="1" u="none" strike="noStrike" cap="none" normalizeH="0" baseline="0" dirty="0">
                 <a:ln>
                   <a:noFill/>
                 </a:ln>
@@ -4411,10 +4406,25 @@
                 <a:effectLst/>
                 <a:latin typeface="Arial" panose="020B0604020202020204" pitchFamily="34" charset="0"/>
                 <a:ea typeface="Times New Roman" panose="02020603050405020304" pitchFamily="18" charset="0"/>
+                <a:cs typeface="Arial" panose="020B0604020202020204" pitchFamily="34" charset="0"/>
+              </a:rPr>
+            </a:br>
+            <a:r>
+              <a:rPr kumimoji="0" lang="en-US" altLang="en-US" sz="900" b="0" i="1" u="none" strike="noStrike" cap="none" normalizeH="0" baseline="0" dirty="0">
+                <a:ln>
+                  <a:noFill/>
+                </a:ln>
+                <a:solidFill>
+                  <a:schemeClr val="tx1"/>
+                </a:solidFill>
+                <a:effectLst/>
+                <a:latin typeface="Arial" panose="020B0604020202020204" pitchFamily="34" charset="0"/>
+                <a:ea typeface="Times New Roman" panose="02020603050405020304" pitchFamily="18" charset="0"/>
+                <a:cs typeface="Arial" panose="020B0604020202020204" pitchFamily="34" charset="0"/>
               </a:rPr>
               <a:t>(PCP EHR-CR)</a:t>
             </a:r>
-            <a:endParaRPr kumimoji="0" lang="en-US" altLang="en-US" sz="1800" b="0" i="0" u="none" strike="noStrike" cap="none" normalizeH="0" baseline="0">
+            <a:endParaRPr kumimoji="0" lang="en-US" altLang="en-US" sz="1800" b="0" i="0" u="none" strike="noStrike" cap="none" normalizeH="0" baseline="0" dirty="0">
               <a:ln>
                 <a:noFill/>
               </a:ln>
@@ -4423,6 +4433,7 @@
               </a:solidFill>
               <a:effectLst/>
               <a:latin typeface="Arial" panose="020B0604020202020204" pitchFamily="34" charset="0"/>
+              <a:cs typeface="Arial" panose="020B0604020202020204" pitchFamily="34" charset="0"/>
             </a:endParaRPr>
           </a:p>
         </p:txBody>
@@ -4443,8 +4454,8 @@
         </p:nvSpPr>
         <p:spPr bwMode="auto">
           <a:xfrm flipH="1">
-            <a:off x="696913" y="457200"/>
-            <a:ext cx="0" cy="1649413"/>
+            <a:off x="677863" y="457200"/>
+            <a:ext cx="19050" cy="2464411"/>
           </a:xfrm>
           <a:prstGeom prst="line">
             <a:avLst/>
@@ -4495,7 +4506,7 @@
         </p:nvSpPr>
         <p:spPr bwMode="auto">
           <a:xfrm>
-            <a:off x="768350" y="457200"/>
+            <a:off x="768350" y="1728433"/>
             <a:ext cx="4192588" cy="0"/>
           </a:xfrm>
           <a:prstGeom prst="line">
@@ -4546,8 +4557,8 @@
         </p:nvSpPr>
         <p:spPr bwMode="auto">
           <a:xfrm>
-            <a:off x="2206625" y="457200"/>
-            <a:ext cx="1104900" cy="260350"/>
+            <a:off x="2117417" y="1059361"/>
+            <a:ext cx="1581150" cy="231967"/>
           </a:xfrm>
           <a:prstGeom prst="rect">
             <a:avLst/>
@@ -4643,7 +4654,7 @@
         </p:nvSpPr>
         <p:spPr bwMode="auto">
           <a:xfrm>
-            <a:off x="4960938" y="457200"/>
+            <a:off x="4960938" y="1616928"/>
             <a:ext cx="114300" cy="280988"/>
           </a:xfrm>
           <a:prstGeom prst="rect">
@@ -4689,7 +4700,7 @@
         </p:nvSpPr>
         <p:spPr bwMode="auto">
           <a:xfrm>
-            <a:off x="3500438" y="457200"/>
+            <a:off x="3500438" y="1360445"/>
             <a:ext cx="114300" cy="280988"/>
           </a:xfrm>
           <a:prstGeom prst="rect">
@@ -4735,7 +4746,7 @@
         </p:nvSpPr>
         <p:spPr bwMode="auto">
           <a:xfrm>
-            <a:off x="768350" y="457200"/>
+            <a:off x="768350" y="1494261"/>
             <a:ext cx="2717800" cy="0"/>
           </a:xfrm>
           <a:prstGeom prst="line">
@@ -4786,8 +4797,8 @@
         </p:nvSpPr>
         <p:spPr bwMode="auto">
           <a:xfrm>
-            <a:off x="1516063" y="457200"/>
-            <a:ext cx="1104900" cy="260350"/>
+            <a:off x="1237282" y="1293536"/>
+            <a:ext cx="1501347" cy="267627"/>
           </a:xfrm>
           <a:prstGeom prst="rect">
             <a:avLst/>
@@ -4841,7 +4852,7 @@
               <a:tabLst/>
             </a:pPr>
             <a:r>
-              <a:rPr kumimoji="0" lang="en-US" altLang="en-US" sz="800" b="0" i="0" u="none" strike="noStrike" cap="none" normalizeH="0" baseline="0">
+              <a:rPr kumimoji="0" lang="en-US" altLang="en-US" sz="800" b="0" i="0" u="none" strike="noStrike" cap="none" normalizeH="0" baseline="0" dirty="0">
                 <a:ln>
                   <a:noFill/>
                 </a:ln>
@@ -4854,7 +4865,7 @@
               </a:rPr>
               <a:t>2. Retrieve Document</a:t>
             </a:r>
-            <a:endParaRPr kumimoji="0" lang="en-US" altLang="en-US" sz="1800" b="0" i="0" u="none" strike="noStrike" cap="none" normalizeH="0" baseline="0">
+            <a:endParaRPr kumimoji="0" lang="en-US" altLang="en-US" sz="1800" b="0" i="0" u="none" strike="noStrike" cap="none" normalizeH="0" baseline="0" dirty="0">
               <a:ln>
                 <a:noFill/>
               </a:ln>
@@ -4883,7 +4894,7 @@
         </p:nvSpPr>
         <p:spPr bwMode="auto">
           <a:xfrm>
-            <a:off x="733425" y="457200"/>
+            <a:off x="733425" y="1271234"/>
             <a:ext cx="4229100" cy="0"/>
           </a:xfrm>
           <a:prstGeom prst="line">
@@ -4934,7 +4945,7 @@
         </p:nvSpPr>
         <p:spPr bwMode="auto">
           <a:xfrm>
-            <a:off x="4953000" y="457200"/>
+            <a:off x="4953000" y="2430965"/>
             <a:ext cx="114300" cy="280988"/>
           </a:xfrm>
           <a:prstGeom prst="rect">
@@ -4980,8 +4991,8 @@
         </p:nvSpPr>
         <p:spPr bwMode="auto">
           <a:xfrm>
-            <a:off x="2197100" y="457200"/>
-            <a:ext cx="1104900" cy="260350"/>
+            <a:off x="2036763" y="1523237"/>
+            <a:ext cx="1389062" cy="280981"/>
           </a:xfrm>
           <a:prstGeom prst="rect">
             <a:avLst/>
@@ -5035,7 +5046,7 @@
               <a:tabLst/>
             </a:pPr>
             <a:r>
-              <a:rPr kumimoji="0" lang="en-US" altLang="en-US" sz="800" b="0" i="0" u="none" strike="noStrike" cap="none" normalizeH="0" baseline="0">
+              <a:rPr kumimoji="0" lang="en-US" altLang="en-US" sz="800" b="0" i="0" u="none" strike="noStrike" cap="none" normalizeH="0" baseline="0" dirty="0">
                 <a:ln>
                   <a:noFill/>
                 </a:ln>
@@ -5048,7 +5059,7 @@
               </a:rPr>
               <a:t>3. Query Documents</a:t>
             </a:r>
-            <a:endParaRPr kumimoji="0" lang="en-US" altLang="en-US" sz="1800" b="0" i="0" u="none" strike="noStrike" cap="none" normalizeH="0" baseline="0">
+            <a:endParaRPr kumimoji="0" lang="en-US" altLang="en-US" sz="1800" b="0" i="0" u="none" strike="noStrike" cap="none" normalizeH="0" baseline="0" dirty="0">
               <a:ln>
                 <a:noFill/>
               </a:ln>
@@ -5077,7 +5088,7 @@
         </p:nvSpPr>
         <p:spPr bwMode="auto">
           <a:xfrm>
-            <a:off x="647700" y="457200"/>
+            <a:off x="647700" y="1126276"/>
             <a:ext cx="120650" cy="701675"/>
           </a:xfrm>
           <a:prstGeom prst="rect">
@@ -5100,75 +5111,6 @@
             <a:prstTxWarp prst="textNoShape">
               <a:avLst/>
             </a:prstTxWarp>
-          </a:bodyPr>
-          <a:lstStyle/>
-          <a:p>
-            <a:endParaRPr lang="en-US"/>
-          </a:p>
-        </p:txBody>
-      </p:sp>
-      <p:sp>
-        <p:nvSpPr>
-          <p:cNvPr id="30" name="Rectangle 27">
-            <a:extLst>
-              <a:ext uri="{FF2B5EF4-FFF2-40B4-BE49-F238E27FC236}">
-                <a16:creationId xmlns:a16="http://schemas.microsoft.com/office/drawing/2014/main" id="{9F3097D0-17E2-BF47-A82C-22DF0819126B}"/>
-              </a:ext>
-            </a:extLst>
-          </p:cNvPr>
-          <p:cNvSpPr>
-            <a:spLocks noChangeArrowheads="1"/>
-          </p:cNvSpPr>
-          <p:nvPr/>
-        </p:nvSpPr>
-        <p:spPr bwMode="auto">
-          <a:xfrm>
-            <a:off x="0" y="0"/>
-            <a:ext cx="12192000" cy="457200"/>
-          </a:xfrm>
-          <a:prstGeom prst="rect">
-            <a:avLst/>
-          </a:prstGeom>
-          <a:noFill/>
-          <a:ln>
-            <a:noFill/>
-          </a:ln>
-          <a:effectLst/>
-          <a:extLst>
-            <a:ext uri="{909E8E84-426E-40DD-AFC4-6F175D3DCCD1}">
-              <a14:hiddenFill xmlns:a14="http://schemas.microsoft.com/office/drawing/2010/main">
-                <a:solidFill>
-                  <a:schemeClr val="accent1"/>
-                </a:solidFill>
-              </a14:hiddenFill>
-            </a:ext>
-            <a:ext uri="{91240B29-F687-4F45-9708-019B960494DF}">
-              <a14:hiddenLine xmlns:a14="http://schemas.microsoft.com/office/drawing/2010/main" w="9525">
-                <a:solidFill>
-                  <a:schemeClr val="tx1"/>
-                </a:solidFill>
-                <a:miter lim="800000"/>
-                <a:headEnd/>
-                <a:tailEnd/>
-              </a14:hiddenLine>
-            </a:ext>
-            <a:ext uri="{AF507438-7753-43E0-B8FC-AC1667EBCBE1}">
-              <a14:hiddenEffects xmlns:a14="http://schemas.microsoft.com/office/drawing/2010/main">
-                <a:effectLst>
-                  <a:outerShdw dist="35921" dir="2700000" algn="ctr" rotWithShape="0">
-                    <a:schemeClr val="bg2"/>
-                  </a:outerShdw>
-                </a:effectLst>
-              </a14:hiddenEffects>
-            </a:ext>
-          </a:extLst>
-        </p:spPr>
-        <p:txBody>
-          <a:bodyPr vert="horz" wrap="none" lIns="91440" tIns="45720" rIns="91440" bIns="45720" numCol="1" anchor="ctr" anchorCtr="0" compatLnSpc="1">
-            <a:prstTxWarp prst="textNoShape">
-              <a:avLst/>
-            </a:prstTxWarp>
-            <a:spAutoFit/>
           </a:bodyPr>
           <a:lstStyle/>
           <a:p>

</xml_diff>